<commit_message>
Update Diagrams.pptx and UiClassDiagram
</commit_message>
<xml_diff>
--- a/docs/diagrams/Diagrams.pptx
+++ b/docs/diagrams/Diagrams.pptx
@@ -217,7 +217,7 @@
           <a:p>
             <a:fld id="{F5CC4B3F-88C1-4FFA-B1B6-F41C21DC6924}" type="datetimeFigureOut">
               <a:rPr lang="en-US" smtClean="0"/>
-              <a:t>11/6/16</a:t>
+              <a:t>11/7/16</a:t>
             </a:fld>
             <a:endParaRPr lang="en-US"/>
           </a:p>
@@ -666,7 +666,7 @@
           <a:p>
             <a:fld id="{78C97017-6FC3-485B-9764-EAC9E56C1D49}" type="datetimeFigureOut">
               <a:rPr lang="en-US" smtClean="0"/>
-              <a:t>11/6/16</a:t>
+              <a:t>11/7/16</a:t>
             </a:fld>
             <a:endParaRPr lang="en-US"/>
           </a:p>
@@ -836,7 +836,7 @@
           <a:p>
             <a:fld id="{78C97017-6FC3-485B-9764-EAC9E56C1D49}" type="datetimeFigureOut">
               <a:rPr lang="en-US" smtClean="0"/>
-              <a:t>11/6/16</a:t>
+              <a:t>11/7/16</a:t>
             </a:fld>
             <a:endParaRPr lang="en-US"/>
           </a:p>
@@ -1016,7 +1016,7 @@
           <a:p>
             <a:fld id="{78C97017-6FC3-485B-9764-EAC9E56C1D49}" type="datetimeFigureOut">
               <a:rPr lang="en-US" smtClean="0"/>
-              <a:t>11/6/16</a:t>
+              <a:t>11/7/16</a:t>
             </a:fld>
             <a:endParaRPr lang="en-US"/>
           </a:p>
@@ -1186,7 +1186,7 @@
           <a:p>
             <a:fld id="{78C97017-6FC3-485B-9764-EAC9E56C1D49}" type="datetimeFigureOut">
               <a:rPr lang="en-US" smtClean="0"/>
-              <a:t>11/6/16</a:t>
+              <a:t>11/7/16</a:t>
             </a:fld>
             <a:endParaRPr lang="en-US"/>
           </a:p>
@@ -1432,7 +1432,7 @@
           <a:p>
             <a:fld id="{78C97017-6FC3-485B-9764-EAC9E56C1D49}" type="datetimeFigureOut">
               <a:rPr lang="en-US" smtClean="0"/>
-              <a:t>11/6/16</a:t>
+              <a:t>11/7/16</a:t>
             </a:fld>
             <a:endParaRPr lang="en-US"/>
           </a:p>
@@ -1720,7 +1720,7 @@
           <a:p>
             <a:fld id="{78C97017-6FC3-485B-9764-EAC9E56C1D49}" type="datetimeFigureOut">
               <a:rPr lang="en-US" smtClean="0"/>
-              <a:t>11/6/16</a:t>
+              <a:t>11/7/16</a:t>
             </a:fld>
             <a:endParaRPr lang="en-US"/>
           </a:p>
@@ -2142,7 +2142,7 @@
           <a:p>
             <a:fld id="{78C97017-6FC3-485B-9764-EAC9E56C1D49}" type="datetimeFigureOut">
               <a:rPr lang="en-US" smtClean="0"/>
-              <a:t>11/6/16</a:t>
+              <a:t>11/7/16</a:t>
             </a:fld>
             <a:endParaRPr lang="en-US"/>
           </a:p>
@@ -2260,7 +2260,7 @@
           <a:p>
             <a:fld id="{78C97017-6FC3-485B-9764-EAC9E56C1D49}" type="datetimeFigureOut">
               <a:rPr lang="en-US" smtClean="0"/>
-              <a:t>11/6/16</a:t>
+              <a:t>11/7/16</a:t>
             </a:fld>
             <a:endParaRPr lang="en-US"/>
           </a:p>
@@ -2355,7 +2355,7 @@
           <a:p>
             <a:fld id="{78C97017-6FC3-485B-9764-EAC9E56C1D49}" type="datetimeFigureOut">
               <a:rPr lang="en-US" smtClean="0"/>
-              <a:t>11/6/16</a:t>
+              <a:t>11/7/16</a:t>
             </a:fld>
             <a:endParaRPr lang="en-US"/>
           </a:p>
@@ -2632,7 +2632,7 @@
           <a:p>
             <a:fld id="{78C97017-6FC3-485B-9764-EAC9E56C1D49}" type="datetimeFigureOut">
               <a:rPr lang="en-US" smtClean="0"/>
-              <a:t>11/6/16</a:t>
+              <a:t>11/7/16</a:t>
             </a:fld>
             <a:endParaRPr lang="en-US"/>
           </a:p>
@@ -2885,7 +2885,7 @@
           <a:p>
             <a:fld id="{78C97017-6FC3-485B-9764-EAC9E56C1D49}" type="datetimeFigureOut">
               <a:rPr lang="en-US" smtClean="0"/>
-              <a:t>11/6/16</a:t>
+              <a:t>11/7/16</a:t>
             </a:fld>
             <a:endParaRPr lang="en-US"/>
           </a:p>
@@ -3098,7 +3098,7 @@
           <a:p>
             <a:fld id="{78C97017-6FC3-485B-9764-EAC9E56C1D49}" type="datetimeFigureOut">
               <a:rPr lang="en-US" smtClean="0"/>
-              <a:t>11/6/16</a:t>
+              <a:t>11/7/16</a:t>
             </a:fld>
             <a:endParaRPr lang="en-US"/>
           </a:p>
@@ -8867,7 +8867,7 @@
         <p:spPr>
           <a:xfrm>
             <a:off x="1217465" y="1447800"/>
-            <a:ext cx="4917083" cy="3962400"/>
+            <a:ext cx="5107135" cy="3962400"/>
           </a:xfrm>
           <a:prstGeom prst="roundRect">
             <a:avLst>
@@ -10160,6 +10160,7 @@
             <a:solidFill>
               <a:schemeClr val="accent3"/>
             </a:solidFill>
+            <a:prstDash val="solid"/>
             <a:tailEnd type="triangle"/>
           </a:ln>
         </p:spPr>
@@ -10298,6 +10299,7 @@
             <a:solidFill>
               <a:schemeClr val="accent3"/>
             </a:solidFill>
+            <a:prstDash val="solid"/>
             <a:tailEnd type="triangle"/>
           </a:ln>
         </p:spPr>
@@ -10333,11 +10335,11 @@
           <a:prstGeom prst="bentConnector2">
             <a:avLst/>
           </a:prstGeom>
-          <a:ln w="12700">
+          <a:ln w="9525" cmpd="sng">
             <a:solidFill>
               <a:schemeClr val="accent3"/>
             </a:solidFill>
-            <a:prstDash val="sysDot"/>
+            <a:prstDash val="solid"/>
             <a:tailEnd type="triangle"/>
           </a:ln>
         </p:spPr>
@@ -10398,14 +10400,12 @@
       <p:cxnSp>
         <p:nvCxnSpPr>
           <p:cNvPr id="49" name="Elbow Connector 48"/>
-          <p:cNvCxnSpPr>
-            <a:endCxn id="43" idx="1"/>
-          </p:cNvCxnSpPr>
+          <p:cNvCxnSpPr/>
           <p:nvPr/>
         </p:nvCxnSpPr>
         <p:spPr>
           <a:xfrm>
-            <a:off x="4190164" y="3476426"/>
+            <a:off x="4189883" y="3468730"/>
             <a:ext cx="315166" cy="292621"/>
           </a:xfrm>
           <a:prstGeom prst="bentConnector3">
@@ -10717,7 +10717,7 @@
               <a:gd name="adj1" fmla="val 72750"/>
             </a:avLst>
           </a:prstGeom>
-          <a:ln w="15875">
+          <a:ln w="9525">
             <a:solidFill>
               <a:schemeClr val="accent3"/>
             </a:solidFill>

</xml_diff>